<commit_message>
Holiday Break Presentation Updates
</commit_message>
<xml_diff>
--- a/High School/Design and Drawing for Production/Unit 6 - Multiview Drawing/Section 1 - Introduction to Multiview Drawings/Assets/Unit 6 - Section 1 - Introduction Multiview.pptx
+++ b/High School/Design and Drawing for Production/Unit 6 - Multiview Drawing/Section 1 - Introduction to Multiview Drawings/Assets/Unit 6 - Section 1 - Introduction Multiview.pptx
@@ -5,17 +5,21 @@
     <p:sldMasterId id="2147483735" r:id="rId1"/>
   </p:sldMasterIdLst>
   <p:notesMasterIdLst>
-    <p:notesMasterId r:id="rId7"/>
+    <p:notesMasterId r:id="rId11"/>
   </p:notesMasterIdLst>
   <p:handoutMasterIdLst>
-    <p:handoutMasterId r:id="rId8"/>
+    <p:handoutMasterId r:id="rId12"/>
   </p:handoutMasterIdLst>
   <p:sldIdLst>
-    <p:sldId id="268" r:id="rId2"/>
-    <p:sldId id="271" r:id="rId3"/>
-    <p:sldId id="272" r:id="rId4"/>
-    <p:sldId id="273" r:id="rId5"/>
-    <p:sldId id="274" r:id="rId6"/>
+    <p:sldId id="275" r:id="rId2"/>
+    <p:sldId id="274" r:id="rId3"/>
+    <p:sldId id="276" r:id="rId4"/>
+    <p:sldId id="277" r:id="rId5"/>
+    <p:sldId id="268" r:id="rId6"/>
+    <p:sldId id="271" r:id="rId7"/>
+    <p:sldId id="272" r:id="rId8"/>
+    <p:sldId id="273" r:id="rId9"/>
+    <p:sldId id="278" r:id="rId10"/>
   </p:sldIdLst>
   <p:sldSz cx="12192000" cy="6858000"/>
   <p:notesSz cx="6858000" cy="9144000"/>
@@ -218,7 +222,7 @@
           <a:p>
             <a:fld id="{6AC4FB8F-ED15-48AB-97BD-17129D4E699D}" type="datetimeFigureOut">
               <a:rPr lang="en-US" smtClean="0"/>
-              <a:t>10/29/2018</a:t>
+              <a:t>11/26/2018</a:t>
             </a:fld>
             <a:endParaRPr lang="en-US" dirty="0"/>
           </a:p>
@@ -383,7 +387,7 @@
           <a:p>
             <a:fld id="{BBC9D437-CD83-4825-AD0D-5E7B341BC79B}" type="datetimeFigureOut">
               <a:rPr lang="en-US" smtClean="0"/>
-              <a:t>10/29/2018</a:t>
+              <a:t>11/26/2018</a:t>
             </a:fld>
             <a:endParaRPr lang="en-US" dirty="0"/>
           </a:p>
@@ -841,7 +845,7 @@
           <a:p>
             <a:fld id="{85AB7CBB-843F-464A-A764-71D6ADC27CFA}" type="datetime1">
               <a:rPr lang="en-US" smtClean="0"/>
-              <a:t>10/29/2018</a:t>
+              <a:t>11/26/2018</a:t>
             </a:fld>
             <a:endParaRPr lang="en-US" dirty="0"/>
           </a:p>
@@ -1294,7 +1298,7 @@
           <a:p>
             <a:fld id="{3F138946-C5C1-4A11-BA69-F12F43F8A94B}" type="datetime1">
               <a:rPr lang="en-US" smtClean="0"/>
-              <a:t>10/29/2018</a:t>
+              <a:t>11/26/2018</a:t>
             </a:fld>
             <a:endParaRPr lang="en-US" dirty="0"/>
           </a:p>
@@ -1550,7 +1554,7 @@
           <a:p>
             <a:fld id="{3F138946-C5C1-4A11-BA69-F12F43F8A94B}" type="datetime1">
               <a:rPr lang="en-US" smtClean="0"/>
-              <a:t>10/29/2018</a:t>
+              <a:t>11/26/2018</a:t>
             </a:fld>
             <a:endParaRPr lang="en-US" dirty="0"/>
           </a:p>
@@ -1864,7 +1868,7 @@
           <a:p>
             <a:fld id="{3F138946-C5C1-4A11-BA69-F12F43F8A94B}" type="datetime1">
               <a:rPr lang="en-US" smtClean="0"/>
-              <a:t>10/29/2018</a:t>
+              <a:t>11/26/2018</a:t>
             </a:fld>
             <a:endParaRPr lang="en-US" dirty="0"/>
           </a:p>
@@ -2188,7 +2192,7 @@
           <a:p>
             <a:fld id="{3F138946-C5C1-4A11-BA69-F12F43F8A94B}" type="datetime1">
               <a:rPr lang="en-US" smtClean="0"/>
-              <a:t>10/29/2018</a:t>
+              <a:t>11/26/2018</a:t>
             </a:fld>
             <a:endParaRPr lang="en-US" dirty="0"/>
           </a:p>
@@ -2496,7 +2500,7 @@
           <a:p>
             <a:fld id="{3F138946-C5C1-4A11-BA69-F12F43F8A94B}" type="datetime1">
               <a:rPr lang="en-US" smtClean="0"/>
-              <a:t>10/29/2018</a:t>
+              <a:t>11/26/2018</a:t>
             </a:fld>
             <a:endParaRPr lang="en-US" dirty="0"/>
           </a:p>
@@ -2869,7 +2873,7 @@
           <a:p>
             <a:fld id="{3F138946-C5C1-4A11-BA69-F12F43F8A94B}" type="datetime1">
               <a:rPr lang="en-US" smtClean="0"/>
-              <a:t>10/29/2018</a:t>
+              <a:t>11/26/2018</a:t>
             </a:fld>
             <a:endParaRPr lang="en-US" dirty="0"/>
           </a:p>
@@ -3049,7 +3053,7 @@
           <a:p>
             <a:fld id="{CBEFC03D-3A1F-4813-9337-02411FCC3A9A}" type="datetime1">
               <a:rPr lang="en-US" smtClean="0"/>
-              <a:t>10/29/2018</a:t>
+              <a:t>11/26/2018</a:t>
             </a:fld>
             <a:endParaRPr lang="en-US" dirty="0"/>
           </a:p>
@@ -3245,7 +3249,7 @@
           <a:p>
             <a:fld id="{3D638F79-DFA0-4C26-9553-23A017B69AB6}" type="datetime1">
               <a:rPr lang="en-US" smtClean="0"/>
-              <a:t>10/29/2018</a:t>
+              <a:t>11/26/2018</a:t>
             </a:fld>
             <a:endParaRPr lang="en-US" dirty="0"/>
           </a:p>
@@ -3356,7 +3360,7 @@
           <a:p>
             <a:fld id="{AA615CA6-EC4D-4728-8AA6-534BE7E9B67C}" type="datetime1">
               <a:rPr lang="en-US" smtClean="0"/>
-              <a:t>10/29/2018</a:t>
+              <a:t>11/26/2018</a:t>
             </a:fld>
             <a:endParaRPr lang="en-US" dirty="0"/>
           </a:p>
@@ -3541,7 +3545,7 @@
           <a:p>
             <a:fld id="{A70B34E7-E1D9-4FBF-A1A0-4009669A00BF}" type="datetime1">
               <a:rPr lang="en-US" smtClean="0"/>
-              <a:t>10/29/2018</a:t>
+              <a:t>11/26/2018</a:t>
             </a:fld>
             <a:endParaRPr lang="en-US" dirty="0"/>
           </a:p>
@@ -3808,7 +3812,7 @@
           <a:p>
             <a:fld id="{C50FD434-5945-4FAF-A8C0-DAE9905532CE}" type="datetimeFigureOut">
               <a:rPr lang="en-US" smtClean="0"/>
-              <a:t>10/29/2018</a:t>
+              <a:t>11/26/2018</a:t>
             </a:fld>
             <a:endParaRPr lang="en-US"/>
           </a:p>
@@ -4056,7 +4060,7 @@
           <a:p>
             <a:fld id="{7579E8B6-2F47-420B-83EA-EB2285D13EC9}" type="datetime1">
               <a:rPr lang="en-US" smtClean="0"/>
-              <a:t>10/29/2018</a:t>
+              <a:t>11/26/2018</a:t>
             </a:fld>
             <a:endParaRPr lang="en-US" dirty="0"/>
           </a:p>
@@ -4454,7 +4458,7 @@
           <a:p>
             <a:fld id="{2304803D-B10E-4B90-8456-A0E05393E233}" type="datetime1">
               <a:rPr lang="en-US" smtClean="0"/>
-              <a:t>10/29/2018</a:t>
+              <a:t>11/26/2018</a:t>
             </a:fld>
             <a:endParaRPr lang="en-US" dirty="0"/>
           </a:p>
@@ -4588,7 +4592,7 @@
           <a:p>
             <a:fld id="{CCE1E62F-6CCE-4064-96C2-2084AF883904}" type="datetime1">
               <a:rPr lang="en-US" smtClean="0"/>
-              <a:t>10/29/2018</a:t>
+              <a:t>11/26/2018</a:t>
             </a:fld>
             <a:endParaRPr lang="en-US" dirty="0"/>
           </a:p>
@@ -4699,7 +4703,7 @@
           <a:p>
             <a:fld id="{AA615CA6-EC4D-4728-8AA6-534BE7E9B67C}" type="datetime1">
               <a:rPr lang="en-US" smtClean="0"/>
-              <a:t>10/29/2018</a:t>
+              <a:t>11/26/2018</a:t>
             </a:fld>
             <a:endParaRPr lang="en-US" dirty="0"/>
           </a:p>
@@ -4970,7 +4974,7 @@
           <a:p>
             <a:fld id="{A6139942-0A2E-443A-842F-D6DE74360370}" type="datetime1">
               <a:rPr lang="en-US" smtClean="0"/>
-              <a:t>10/29/2018</a:t>
+              <a:t>11/26/2018</a:t>
             </a:fld>
             <a:endParaRPr lang="en-US" dirty="0"/>
           </a:p>
@@ -5269,7 +5273,7 @@
           <a:p>
             <a:fld id="{C50FD434-5945-4FAF-A8C0-DAE9905532CE}" type="datetimeFigureOut">
               <a:rPr lang="en-US" smtClean="0"/>
-              <a:t>10/29/2018</a:t>
+              <a:t>11/26/2018</a:t>
             </a:fld>
             <a:endParaRPr lang="en-US"/>
           </a:p>
@@ -5322,7 +5326,7 @@
           <p:cNvPr id="8" name="Rectangle 7">
             <a:extLst>
               <a:ext uri="{FF2B5EF4-FFF2-40B4-BE49-F238E27FC236}">
-                <a16:creationId xmlns:a16="http://schemas.microsoft.com/office/drawing/2014/main" xmlns="" id="{CEC947AC-3793-4C58-9767-D55CE5C13326}"/>
+                <a16:creationId xmlns:a16="http://schemas.microsoft.com/office/drawing/2014/main" id="{CEC947AC-3793-4C58-9767-D55CE5C13326}"/>
               </a:ext>
             </a:extLst>
           </p:cNvPr>
@@ -5739,7 +5743,7 @@
           <a:p>
             <a:fld id="{3F138946-C5C1-4A11-BA69-F12F43F8A94B}" type="datetime1">
               <a:rPr lang="en-US" smtClean="0"/>
-              <a:t>10/29/2018</a:t>
+              <a:t>11/26/2018</a:t>
             </a:fld>
             <a:endParaRPr lang="en-US" dirty="0"/>
           </a:p>
@@ -6295,31 +6299,6 @@
 <file path=ppt/slides/slide1.xml><?xml version="1.0" encoding="utf-8"?>
 <p:sld xmlns:a="http://schemas.openxmlformats.org/drawingml/2006/main" xmlns:r="http://schemas.openxmlformats.org/officeDocument/2006/relationships" xmlns:p="http://schemas.openxmlformats.org/presentationml/2006/main">
   <p:cSld>
-    <p:bg>
-      <p:bgPr>
-        <a:gradFill rotWithShape="1">
-          <a:gsLst>
-            <a:gs pos="10000">
-              <a:schemeClr val="bg1">
-                <a:tint val="97000"/>
-                <a:hueMod val="92000"/>
-                <a:satMod val="169000"/>
-                <a:lumMod val="164000"/>
-              </a:schemeClr>
-            </a:gs>
-            <a:gs pos="100000">
-              <a:schemeClr val="bg1">
-                <a:shade val="96000"/>
-                <a:satMod val="120000"/>
-                <a:lumMod val="90000"/>
-              </a:schemeClr>
-            </a:gs>
-          </a:gsLst>
-          <a:lin ang="6120000" scaled="1"/>
-        </a:gradFill>
-        <a:effectLst/>
-      </p:bgPr>
-    </p:bg>
     <p:spTree>
       <p:nvGrpSpPr>
         <p:cNvPr id="1" name=""/>
@@ -6336,168 +6315,10 @@
       </p:grpSpPr>
       <p:sp>
         <p:nvSpPr>
-          <p:cNvPr id="2" name="Title 1"/>
-          <p:cNvSpPr>
-            <a:spLocks noGrp="1"/>
-          </p:cNvSpPr>
-          <p:nvPr>
-            <p:ph type="ctrTitle"/>
-          </p:nvPr>
-        </p:nvSpPr>
-        <p:spPr>
-          <a:xfrm>
-            <a:off x="684212" y="685799"/>
-            <a:ext cx="9678988" cy="3673474"/>
-          </a:xfrm>
-        </p:spPr>
-        <p:txBody>
-          <a:bodyPr>
-            <a:normAutofit/>
-          </a:bodyPr>
-          <a:lstStyle/>
-          <a:p>
-            <a:r>
-              <a:rPr lang="en-US" sz="6000">
-                <a:solidFill>
-                  <a:schemeClr val="tx2"/>
-                </a:solidFill>
-              </a:rPr>
-              <a:t>Design and drawing for production</a:t>
-            </a:r>
-          </a:p>
-        </p:txBody>
-      </p:sp>
-      <p:sp>
-        <p:nvSpPr>
-          <p:cNvPr id="3" name="Subtitle 2"/>
-          <p:cNvSpPr>
-            <a:spLocks noGrp="1"/>
-          </p:cNvSpPr>
-          <p:nvPr>
-            <p:ph type="subTitle" idx="1"/>
-          </p:nvPr>
-        </p:nvSpPr>
-        <p:spPr>
-          <a:xfrm>
-            <a:off x="684212" y="4648198"/>
-            <a:ext cx="7005742" cy="1143002"/>
-          </a:xfrm>
-        </p:spPr>
-        <p:txBody>
-          <a:bodyPr>
-            <a:normAutofit/>
-          </a:bodyPr>
-          <a:lstStyle/>
-          <a:p>
-            <a:pPr>
-              <a:lnSpc>
-                <a:spcPct val="90000"/>
-              </a:lnSpc>
-            </a:pPr>
-            <a:r>
-              <a:rPr lang="en-US" sz="1900" dirty="0">
-                <a:solidFill>
-                  <a:schemeClr val="tx1">
-                    <a:alpha val="80000"/>
-                  </a:schemeClr>
-                </a:solidFill>
-              </a:rPr>
-              <a:t>Unit </a:t>
-            </a:r>
-            <a:r>
-              <a:rPr lang="en-US" sz="1900" dirty="0" smtClean="0">
-                <a:solidFill>
-                  <a:schemeClr val="tx1">
-                    <a:alpha val="80000"/>
-                  </a:schemeClr>
-                </a:solidFill>
-              </a:rPr>
-              <a:t>5 </a:t>
-            </a:r>
-            <a:r>
-              <a:rPr lang="en-US" sz="1900" dirty="0">
-                <a:solidFill>
-                  <a:schemeClr val="tx1">
-                    <a:alpha val="80000"/>
-                  </a:schemeClr>
-                </a:solidFill>
-              </a:rPr>
-              <a:t>– </a:t>
-            </a:r>
-            <a:r>
-              <a:rPr lang="en-US" sz="1900" dirty="0" smtClean="0">
-                <a:solidFill>
-                  <a:schemeClr val="tx1">
-                    <a:alpha val="80000"/>
-                  </a:schemeClr>
-                </a:solidFill>
-              </a:rPr>
-              <a:t>Basic Geometry</a:t>
-            </a:r>
-            <a:endParaRPr lang="en-US" sz="1900" dirty="0">
-              <a:solidFill>
-                <a:schemeClr val="tx1">
-                  <a:alpha val="80000"/>
-                </a:schemeClr>
-              </a:solidFill>
-            </a:endParaRPr>
-          </a:p>
-          <a:p>
-            <a:pPr>
-              <a:lnSpc>
-                <a:spcPct val="90000"/>
-              </a:lnSpc>
-            </a:pPr>
-            <a:endParaRPr lang="en-US" sz="1900" dirty="0">
-              <a:solidFill>
-                <a:schemeClr val="tx1">
-                  <a:alpha val="80000"/>
-                </a:schemeClr>
-              </a:solidFill>
-            </a:endParaRPr>
-          </a:p>
-          <a:p>
-            <a:pPr>
-              <a:lnSpc>
-                <a:spcPct val="90000"/>
-              </a:lnSpc>
-            </a:pPr>
-            <a:r>
-              <a:rPr lang="en-US" sz="1900" dirty="0">
-                <a:solidFill>
-                  <a:schemeClr val="tx1">
-                    <a:alpha val="80000"/>
-                  </a:schemeClr>
-                </a:solidFill>
-              </a:rPr>
-              <a:t>Section 1 – </a:t>
-            </a:r>
-            <a:r>
-              <a:rPr lang="en-US" sz="1900" dirty="0" smtClean="0">
-                <a:solidFill>
-                  <a:schemeClr val="tx1">
-                    <a:alpha val="80000"/>
-                  </a:schemeClr>
-                </a:solidFill>
-              </a:rPr>
-              <a:t>Basic Geometry</a:t>
-            </a:r>
-            <a:endParaRPr lang="en-US" sz="1900" dirty="0">
-              <a:solidFill>
-                <a:schemeClr val="tx1">
-                  <a:alpha val="80000"/>
-                </a:schemeClr>
-              </a:solidFill>
-            </a:endParaRPr>
-          </a:p>
-        </p:txBody>
-      </p:sp>
-      <p:sp>
-        <p:nvSpPr>
-          <p:cNvPr id="4" name="Footer Placeholder 3">
+          <p:cNvPr id="3" name="Title 2">
             <a:extLst>
               <a:ext uri="{FF2B5EF4-FFF2-40B4-BE49-F238E27FC236}">
-                <a16:creationId xmlns:a16="http://schemas.microsoft.com/office/drawing/2014/main" xmlns="" id="{1BD89EEB-0D82-48BB-B45A-39C4807CF951}"/>
+                <a16:creationId xmlns:a16="http://schemas.microsoft.com/office/drawing/2014/main" id="{1825CCB3-7137-40A0-8481-1D04EE3AE490}"/>
               </a:ext>
             </a:extLst>
           </p:cNvPr>
@@ -6505,41 +6326,158 @@
             <a:spLocks noGrp="1"/>
           </p:cNvSpPr>
           <p:nvPr>
+            <p:ph type="ctrTitle"/>
+          </p:nvPr>
+        </p:nvSpPr>
+        <p:spPr/>
+        <p:txBody>
+          <a:bodyPr/>
+          <a:lstStyle/>
+          <a:p>
+            <a:r>
+              <a:rPr lang="en-US" dirty="0"/>
+              <a:t>Hour of code</a:t>
+            </a:r>
+          </a:p>
+        </p:txBody>
+      </p:sp>
+      <p:sp>
+        <p:nvSpPr>
+          <p:cNvPr id="4" name="Subtitle 3">
+            <a:extLst>
+              <a:ext uri="{FF2B5EF4-FFF2-40B4-BE49-F238E27FC236}">
+                <a16:creationId xmlns:a16="http://schemas.microsoft.com/office/drawing/2014/main" id="{59A2469B-35AA-4AB4-84C2-F0F5309C845B}"/>
+              </a:ext>
+            </a:extLst>
+          </p:cNvPr>
+          <p:cNvSpPr>
+            <a:spLocks noGrp="1"/>
+          </p:cNvSpPr>
+          <p:nvPr>
+            <p:ph type="subTitle" idx="1"/>
+          </p:nvPr>
+        </p:nvSpPr>
+        <p:spPr/>
+        <p:txBody>
+          <a:bodyPr>
+            <a:normAutofit lnSpcReduction="10000"/>
+          </a:bodyPr>
+          <a:lstStyle/>
+          <a:p>
+            <a:r>
+              <a:rPr lang="en-US" sz="2400" dirty="0"/>
+              <a:t>December 4</a:t>
+            </a:r>
+            <a:r>
+              <a:rPr lang="en-US" sz="2400" baseline="30000" dirty="0"/>
+              <a:t>th</a:t>
+            </a:r>
+          </a:p>
+          <a:p>
+            <a:r>
+              <a:rPr lang="en-US" sz="2400" dirty="0"/>
+              <a:t>During your free period</a:t>
+            </a:r>
+          </a:p>
+          <a:p>
+            <a:r>
+              <a:rPr lang="en-US" sz="2400" dirty="0"/>
+              <a:t>Room 238</a:t>
+            </a:r>
+          </a:p>
+          <a:p>
+            <a:r>
+              <a:rPr lang="en-US" sz="2400" dirty="0"/>
+              <a:t>Minecraft Adventurer</a:t>
+            </a:r>
+          </a:p>
+        </p:txBody>
+      </p:sp>
+      <p:sp>
+        <p:nvSpPr>
+          <p:cNvPr id="2" name="Footer Placeholder 1">
+            <a:extLst>
+              <a:ext uri="{FF2B5EF4-FFF2-40B4-BE49-F238E27FC236}">
+                <a16:creationId xmlns:a16="http://schemas.microsoft.com/office/drawing/2014/main" id="{9BB4E3CE-4053-4CC5-9D94-E540D1AD5161}"/>
+              </a:ext>
+            </a:extLst>
+          </p:cNvPr>
+          <p:cNvSpPr>
+            <a:spLocks noGrp="1"/>
+          </p:cNvSpPr>
+          <p:nvPr>
             <p:ph type="ftr" sz="quarter" idx="11"/>
           </p:nvPr>
         </p:nvSpPr>
         <p:spPr/>
         <p:txBody>
-          <a:bodyPr>
-            <a:normAutofit/>
-          </a:bodyPr>
-          <a:lstStyle/>
-          <a:p>
-            <a:pPr>
-              <a:spcAft>
-                <a:spcPts val="600"/>
-              </a:spcAft>
-            </a:pPr>
-            <a:r>
-              <a:rPr lang="en-US">
-                <a:solidFill>
-                  <a:schemeClr val="tx2"/>
-                </a:solidFill>
-              </a:rPr>
-              <a:t>Unit 1 – Section 1</a:t>
-            </a:r>
-          </a:p>
-        </p:txBody>
-      </p:sp>
+          <a:bodyPr/>
+          <a:lstStyle/>
+          <a:p>
+            <a:r>
+              <a:rPr lang="en-US"/>
+              <a:t>Add a footer</a:t>
+            </a:r>
+            <a:endParaRPr lang="en-US" dirty="0"/>
+          </a:p>
+        </p:txBody>
+      </p:sp>
+      <p:pic>
+        <p:nvPicPr>
+          <p:cNvPr id="5122" name="Picture 2" descr="https://hourofcode.com/us/en/images/hour-of-code-logo.png">
+            <a:extLst>
+              <a:ext uri="{FF2B5EF4-FFF2-40B4-BE49-F238E27FC236}">
+                <a16:creationId xmlns:a16="http://schemas.microsoft.com/office/drawing/2014/main" id="{E41942F4-0BB7-4BD8-90FB-7E63B02A37C4}"/>
+              </a:ext>
+            </a:extLst>
+          </p:cNvPr>
+          <p:cNvPicPr>
+            <a:picLocks noChangeAspect="1" noChangeArrowheads="1"/>
+          </p:cNvPicPr>
+          <p:nvPr/>
+        </p:nvPicPr>
+        <p:blipFill>
+          <a:blip r:embed="rId2">
+            <a:extLst>
+              <a:ext uri="{28A0092B-C50C-407E-A947-70E740481C1C}">
+                <a14:useLocalDpi xmlns:a14="http://schemas.microsoft.com/office/drawing/2010/main" val="0"/>
+              </a:ext>
+            </a:extLst>
+          </a:blip>
+          <a:srcRect/>
+          <a:stretch>
+            <a:fillRect/>
+          </a:stretch>
+        </p:blipFill>
+        <p:spPr bwMode="auto">
+          <a:xfrm>
+            <a:off x="6955972" y="641387"/>
+            <a:ext cx="4745491" cy="4745491"/>
+          </a:xfrm>
+          <a:prstGeom prst="rect">
+            <a:avLst/>
+          </a:prstGeom>
+          <a:noFill/>
+          <a:extLst>
+            <a:ext uri="{909E8E84-426E-40DD-AFC4-6F175D3DCCD1}">
+              <a14:hiddenFill xmlns:a14="http://schemas.microsoft.com/office/drawing/2010/main">
+                <a:solidFill>
+                  <a:srgbClr val="FFFFFF"/>
+                </a:solidFill>
+              </a14:hiddenFill>
+            </a:ext>
+          </a:extLst>
+        </p:spPr>
+      </p:pic>
     </p:spTree>
     <p:extLst>
       <p:ext uri="{BB962C8B-B14F-4D97-AF65-F5344CB8AC3E}">
-        <p14:creationId xmlns:p14="http://schemas.microsoft.com/office/powerpoint/2010/main" val="2413251912"/>
+        <p14:creationId xmlns:p14="http://schemas.microsoft.com/office/powerpoint/2010/main" val="775033941"/>
       </p:ext>
     </p:extLst>
   </p:cSld>
   <p:clrMapOvr>
-    <a:overrideClrMapping bg1="lt1" tx1="dk1" bg2="lt2" tx2="dk2" accent1="accent1" accent2="accent2" accent3="accent3" accent4="accent4" accent5="accent5" accent6="accent6" hlink="hlink" folHlink="folHlink"/>
+    <a:masterClrMapping/>
   </p:clrMapOvr>
   <mc:AlternateContent xmlns:mc="http://schemas.openxmlformats.org/markup-compatibility/2006" xmlns:p14="http://schemas.microsoft.com/office/powerpoint/2010/main">
     <mc:Choice Requires="p14">
@@ -6600,121 +6538,10 @@
       </p:grpSpPr>
       <p:sp>
         <p:nvSpPr>
-          <p:cNvPr id="2" name="Title 1"/>
-          <p:cNvSpPr>
-            <a:spLocks noGrp="1"/>
-          </p:cNvSpPr>
-          <p:nvPr>
-            <p:ph type="title"/>
-          </p:nvPr>
-        </p:nvSpPr>
-        <p:spPr>
-          <a:xfrm>
-            <a:off x="684212" y="685799"/>
-            <a:ext cx="3747111" cy="4892040"/>
-          </a:xfrm>
-        </p:spPr>
-        <p:txBody>
-          <a:bodyPr>
-            <a:normAutofit/>
-          </a:bodyPr>
-          <a:lstStyle/>
-          <a:p>
-            <a:pPr algn="r"/>
-            <a:r>
-              <a:rPr lang="en-US"/>
-              <a:t>The big idea</a:t>
-            </a:r>
-          </a:p>
-        </p:txBody>
-      </p:sp>
-      <p:sp>
-        <p:nvSpPr>
-          <p:cNvPr id="3" name="Content Placeholder 2"/>
-          <p:cNvSpPr>
-            <a:spLocks noGrp="1"/>
-          </p:cNvSpPr>
-          <p:nvPr>
-            <p:ph idx="1"/>
-          </p:nvPr>
-        </p:nvSpPr>
-        <p:spPr>
-          <a:xfrm>
-            <a:off x="4979962" y="685799"/>
-            <a:ext cx="6288260" cy="4892040"/>
-          </a:xfrm>
-        </p:spPr>
-        <p:txBody>
-          <a:bodyPr>
-            <a:normAutofit/>
-          </a:bodyPr>
-          <a:lstStyle/>
-          <a:p>
-            <a:r>
-              <a:rPr lang="en-US" dirty="0" smtClean="0">
-                <a:solidFill>
-                  <a:schemeClr val="tx1"/>
-                </a:solidFill>
-                <a:cs typeface="Arial" pitchFamily="34" charset="0"/>
-              </a:rPr>
-              <a:t>Straight lines can be used to perform basic geometric functions</a:t>
-            </a:r>
-          </a:p>
-          <a:p>
-            <a:r>
-              <a:rPr lang="en-US" dirty="0" smtClean="0">
-                <a:solidFill>
-                  <a:schemeClr val="tx1"/>
-                </a:solidFill>
-                <a:cs typeface="Arial" pitchFamily="34" charset="0"/>
-              </a:rPr>
-              <a:t>Straight lines can be used to construct, bisect, and transfer angles</a:t>
-            </a:r>
-          </a:p>
-          <a:p>
-            <a:r>
-              <a:rPr lang="en-US" dirty="0" smtClean="0">
-                <a:solidFill>
-                  <a:schemeClr val="tx1"/>
-                </a:solidFill>
-                <a:cs typeface="Arial" pitchFamily="34" charset="0"/>
-              </a:rPr>
-              <a:t>Polygons are geometric objects enclosed with straight lines</a:t>
-            </a:r>
-          </a:p>
-          <a:p>
-            <a:r>
-              <a:rPr lang="en-US" dirty="0" smtClean="0">
-                <a:solidFill>
-                  <a:schemeClr val="tx1"/>
-                </a:solidFill>
-                <a:cs typeface="Arial" pitchFamily="34" charset="0"/>
-              </a:rPr>
-              <a:t>Squares are a special type of polygon called a regular polygon</a:t>
-            </a:r>
-            <a:endParaRPr lang="en-US" dirty="0" smtClean="0">
-              <a:solidFill>
-                <a:schemeClr val="tx1"/>
-              </a:solidFill>
-              <a:cs typeface="Arial" pitchFamily="34" charset="0"/>
-            </a:endParaRPr>
-          </a:p>
-          <a:p>
-            <a:endParaRPr lang="en-US" dirty="0">
-              <a:solidFill>
-                <a:schemeClr val="tx1"/>
-              </a:solidFill>
-              <a:cs typeface="Arial" pitchFamily="34" charset="0"/>
-            </a:endParaRPr>
-          </a:p>
-        </p:txBody>
-      </p:sp>
-      <p:sp>
-        <p:nvSpPr>
           <p:cNvPr id="4" name="Footer Placeholder 3">
             <a:extLst>
               <a:ext uri="{FF2B5EF4-FFF2-40B4-BE49-F238E27FC236}">
-                <a16:creationId xmlns:a16="http://schemas.microsoft.com/office/drawing/2014/main" xmlns="" id="{EADFB87E-2A3F-4815-8F5E-3CF3521EBF24}"/>
+                <a16:creationId xmlns:a16="http://schemas.microsoft.com/office/drawing/2014/main" id="{11EA7AD5-F24F-413C-B2B6-B8330C92C4D8}"/>
               </a:ext>
             </a:extLst>
           </p:cNvPr>
@@ -6727,33 +6554,84 @@
         </p:nvSpPr>
         <p:spPr/>
         <p:txBody>
-          <a:bodyPr>
+          <a:bodyPr vert="horz" lIns="91440" tIns="45720" rIns="91440" bIns="45720" rtlCol="0" anchor="t">
             <a:normAutofit/>
           </a:bodyPr>
           <a:lstStyle/>
           <a:p>
-            <a:pPr>
+            <a:pPr defTabSz="914400">
               <a:spcAft>
                 <a:spcPts val="600"/>
               </a:spcAft>
             </a:pPr>
             <a:r>
-              <a:rPr lang="en-US">
-                <a:solidFill>
-                  <a:schemeClr val="tx1">
-                    <a:alpha val="80000"/>
+              <a:rPr lang="en-US" b="0" i="0" kern="1200">
+                <a:solidFill>
+                  <a:schemeClr val="bg2">
+                    <a:lumMod val="50000"/>
                   </a:schemeClr>
                 </a:solidFill>
+                <a:effectLst/>
+                <a:latin typeface="+mn-lt"/>
+                <a:ea typeface="+mn-ea"/>
+                <a:cs typeface="+mn-cs"/>
               </a:rPr>
-              <a:t>Unit 1 – Section 1 - Day 1</a:t>
-            </a:r>
-          </a:p>
-        </p:txBody>
-      </p:sp>
+              <a:t>Add a footer</a:t>
+            </a:r>
+          </a:p>
+        </p:txBody>
+      </p:sp>
+      <p:pic>
+        <p:nvPicPr>
+          <p:cNvPr id="5" name="Picture 4" descr="https://hourofcode.com/images/social-media/social-1.png">
+            <a:extLst>
+              <a:ext uri="{FF2B5EF4-FFF2-40B4-BE49-F238E27FC236}">
+                <a16:creationId xmlns:a16="http://schemas.microsoft.com/office/drawing/2014/main" id="{FC347556-ED98-4186-9DB3-F5626470D86E}"/>
+              </a:ext>
+            </a:extLst>
+          </p:cNvPr>
+          <p:cNvPicPr>
+            <a:picLocks noChangeAspect="1" noChangeArrowheads="1"/>
+          </p:cNvPicPr>
+          <p:nvPr/>
+        </p:nvPicPr>
+        <p:blipFill>
+          <a:blip r:embed="rId2">
+            <a:extLst>
+              <a:ext uri="{28A0092B-C50C-407E-A947-70E740481C1C}">
+                <a14:useLocalDpi xmlns:a14="http://schemas.microsoft.com/office/drawing/2010/main" val="0"/>
+              </a:ext>
+            </a:extLst>
+          </a:blip>
+          <a:srcRect/>
+          <a:stretch>
+            <a:fillRect/>
+          </a:stretch>
+        </p:blipFill>
+        <p:spPr bwMode="auto">
+          <a:xfrm>
+            <a:off x="0" y="-30178"/>
+            <a:ext cx="12192000" cy="6918356"/>
+          </a:xfrm>
+          <a:prstGeom prst="rect">
+            <a:avLst/>
+          </a:prstGeom>
+          <a:noFill/>
+          <a:extLst>
+            <a:ext uri="{909E8E84-426E-40DD-AFC4-6F175D3DCCD1}">
+              <a14:hiddenFill xmlns:a14="http://schemas.microsoft.com/office/drawing/2010/main">
+                <a:solidFill>
+                  <a:srgbClr val="FFFFFF"/>
+                </a:solidFill>
+              </a14:hiddenFill>
+            </a:ext>
+          </a:extLst>
+        </p:spPr>
+      </p:pic>
     </p:spTree>
     <p:extLst>
       <p:ext uri="{BB962C8B-B14F-4D97-AF65-F5344CB8AC3E}">
-        <p14:creationId xmlns:p14="http://schemas.microsoft.com/office/powerpoint/2010/main" val="78530218"/>
+        <p14:creationId xmlns:p14="http://schemas.microsoft.com/office/powerpoint/2010/main" val="577680186"/>
       </p:ext>
     </p:extLst>
   </p:cSld>
@@ -6794,12 +6672,18 @@
       </p:grpSpPr>
       <p:sp>
         <p:nvSpPr>
-          <p:cNvPr id="5" name="Title 4"/>
-          <p:cNvSpPr>
-            <a:spLocks noGrp="1"/>
-          </p:cNvSpPr>
-          <p:nvPr>
-            <p:ph type="title"/>
+          <p:cNvPr id="2" name="Footer Placeholder 1">
+            <a:extLst>
+              <a:ext uri="{FF2B5EF4-FFF2-40B4-BE49-F238E27FC236}">
+                <a16:creationId xmlns:a16="http://schemas.microsoft.com/office/drawing/2014/main" id="{AE223372-B76E-489B-A9B9-D2AAD2E03833}"/>
+              </a:ext>
+            </a:extLst>
+          </p:cNvPr>
+          <p:cNvSpPr>
+            <a:spLocks noGrp="1"/>
+          </p:cNvSpPr>
+          <p:nvPr>
+            <p:ph type="ftr" sz="quarter" idx="11"/>
           </p:nvPr>
         </p:nvSpPr>
         <p:spPr/>
@@ -6808,75 +6692,64 @@
           <a:lstStyle/>
           <a:p>
             <a:r>
-              <a:rPr lang="en-US" dirty="0" smtClean="0"/>
-              <a:t>DDP THIS WEEK</a:t>
-            </a:r>
-            <a:endParaRPr lang="en-US" dirty="0"/>
-          </a:p>
-        </p:txBody>
-      </p:sp>
-      <p:sp>
-        <p:nvSpPr>
-          <p:cNvPr id="6" name="Content Placeholder 5"/>
-          <p:cNvSpPr>
-            <a:spLocks noGrp="1"/>
-          </p:cNvSpPr>
-          <p:nvPr>
-            <p:ph idx="1"/>
-          </p:nvPr>
-        </p:nvSpPr>
-        <p:spPr/>
-        <p:txBody>
-          <a:bodyPr/>
-          <a:lstStyle/>
-          <a:p>
-            <a:r>
-              <a:rPr lang="en-US" dirty="0" smtClean="0"/>
-              <a:t>Introduction to Unit 5 Basic Geometry In Drafting</a:t>
-            </a:r>
-          </a:p>
-          <a:p>
-            <a:r>
-              <a:rPr lang="en-US" dirty="0" smtClean="0"/>
-              <a:t>New drawings</a:t>
-            </a:r>
-          </a:p>
-          <a:p>
-            <a:r>
-              <a:rPr lang="en-US" dirty="0" smtClean="0"/>
-              <a:t>Once completed we will move into our first design project ‘sustainable container home’</a:t>
-            </a:r>
-            <a:endParaRPr lang="en-US" dirty="0"/>
-          </a:p>
-        </p:txBody>
-      </p:sp>
-      <p:sp>
-        <p:nvSpPr>
-          <p:cNvPr id="4" name="Footer Placeholder 3"/>
-          <p:cNvSpPr>
-            <a:spLocks noGrp="1"/>
-          </p:cNvSpPr>
-          <p:nvPr>
-            <p:ph type="ftr" sz="quarter" idx="11"/>
-          </p:nvPr>
-        </p:nvSpPr>
-        <p:spPr/>
-        <p:txBody>
-          <a:bodyPr/>
-          <a:lstStyle/>
-          <a:p>
-            <a:r>
-              <a:rPr lang="en-US" smtClean="0"/>
+              <a:rPr lang="en-US"/>
               <a:t>Add a footer</a:t>
             </a:r>
             <a:endParaRPr lang="en-US" dirty="0"/>
           </a:p>
         </p:txBody>
       </p:sp>
+      <p:pic>
+        <p:nvPicPr>
+          <p:cNvPr id="3074" name="Picture 2" descr="https://hourofcode.com/images/social-media/social-3.png">
+            <a:extLst>
+              <a:ext uri="{FF2B5EF4-FFF2-40B4-BE49-F238E27FC236}">
+                <a16:creationId xmlns:a16="http://schemas.microsoft.com/office/drawing/2014/main" id="{09968F73-143A-47C9-AC2A-B1A33EC1AECD}"/>
+              </a:ext>
+            </a:extLst>
+          </p:cNvPr>
+          <p:cNvPicPr>
+            <a:picLocks noChangeAspect="1" noChangeArrowheads="1"/>
+          </p:cNvPicPr>
+          <p:nvPr/>
+        </p:nvPicPr>
+        <p:blipFill>
+          <a:blip r:embed="rId2">
+            <a:extLst>
+              <a:ext uri="{28A0092B-C50C-407E-A947-70E740481C1C}">
+                <a14:useLocalDpi xmlns:a14="http://schemas.microsoft.com/office/drawing/2010/main" val="0"/>
+              </a:ext>
+            </a:extLst>
+          </a:blip>
+          <a:srcRect/>
+          <a:stretch>
+            <a:fillRect/>
+          </a:stretch>
+        </p:blipFill>
+        <p:spPr bwMode="auto">
+          <a:xfrm>
+            <a:off x="0" y="1588"/>
+            <a:ext cx="12192000" cy="6854825"/>
+          </a:xfrm>
+          <a:prstGeom prst="rect">
+            <a:avLst/>
+          </a:prstGeom>
+          <a:noFill/>
+          <a:extLst>
+            <a:ext uri="{909E8E84-426E-40DD-AFC4-6F175D3DCCD1}">
+              <a14:hiddenFill xmlns:a14="http://schemas.microsoft.com/office/drawing/2010/main">
+                <a:solidFill>
+                  <a:srgbClr val="FFFFFF"/>
+                </a:solidFill>
+              </a14:hiddenFill>
+            </a:ext>
+          </a:extLst>
+        </p:spPr>
+      </p:pic>
     </p:spTree>
     <p:extLst>
       <p:ext uri="{BB962C8B-B14F-4D97-AF65-F5344CB8AC3E}">
-        <p14:creationId xmlns:p14="http://schemas.microsoft.com/office/powerpoint/2010/main" val="1669773747"/>
+        <p14:creationId xmlns:p14="http://schemas.microsoft.com/office/powerpoint/2010/main" val="3970906237"/>
       </p:ext>
     </p:extLst>
   </p:cSld>
@@ -6917,12 +6790,18 @@
       </p:grpSpPr>
       <p:sp>
         <p:nvSpPr>
-          <p:cNvPr id="2" name="Title 1"/>
-          <p:cNvSpPr>
-            <a:spLocks noGrp="1"/>
-          </p:cNvSpPr>
-          <p:nvPr>
-            <p:ph type="title"/>
+          <p:cNvPr id="2" name="Footer Placeholder 1">
+            <a:extLst>
+              <a:ext uri="{FF2B5EF4-FFF2-40B4-BE49-F238E27FC236}">
+                <a16:creationId xmlns:a16="http://schemas.microsoft.com/office/drawing/2014/main" id="{F3FB9EAB-2F16-4AEB-B1AB-BB451EF0F0AE}"/>
+              </a:ext>
+            </a:extLst>
+          </p:cNvPr>
+          <p:cNvSpPr>
+            <a:spLocks noGrp="1"/>
+          </p:cNvSpPr>
+          <p:nvPr>
+            <p:ph type="ftr" sz="quarter" idx="11"/>
           </p:nvPr>
         </p:nvSpPr>
         <p:spPr/>
@@ -6931,75 +6810,64 @@
           <a:lstStyle/>
           <a:p>
             <a:r>
-              <a:rPr lang="en-US" dirty="0" smtClean="0"/>
-              <a:t>Straight lines</a:t>
-            </a:r>
-            <a:endParaRPr lang="en-US" dirty="0"/>
-          </a:p>
-        </p:txBody>
-      </p:sp>
-      <p:sp>
-        <p:nvSpPr>
-          <p:cNvPr id="3" name="Content Placeholder 2"/>
-          <p:cNvSpPr>
-            <a:spLocks noGrp="1"/>
-          </p:cNvSpPr>
-          <p:nvPr>
-            <p:ph idx="1"/>
-          </p:nvPr>
-        </p:nvSpPr>
-        <p:spPr/>
-        <p:txBody>
-          <a:bodyPr/>
-          <a:lstStyle/>
-          <a:p>
-            <a:r>
-              <a:rPr lang="en-US" dirty="0" smtClean="0"/>
-              <a:t>Bisecting Lines</a:t>
-            </a:r>
-          </a:p>
-          <a:p>
-            <a:r>
-              <a:rPr lang="en-US" dirty="0" smtClean="0"/>
-              <a:t>A line can be bisected by using a triangle and a T-Square</a:t>
-            </a:r>
-          </a:p>
-          <a:p>
-            <a:r>
-              <a:rPr lang="en-US" dirty="0" smtClean="0"/>
-              <a:t>Divided into two (2) equal parts</a:t>
-            </a:r>
-            <a:endParaRPr lang="en-US" dirty="0"/>
-          </a:p>
-        </p:txBody>
-      </p:sp>
-      <p:sp>
-        <p:nvSpPr>
-          <p:cNvPr id="4" name="Footer Placeholder 3"/>
-          <p:cNvSpPr>
-            <a:spLocks noGrp="1"/>
-          </p:cNvSpPr>
-          <p:nvPr>
-            <p:ph type="ftr" sz="quarter" idx="11"/>
-          </p:nvPr>
-        </p:nvSpPr>
-        <p:spPr/>
-        <p:txBody>
-          <a:bodyPr/>
-          <a:lstStyle/>
-          <a:p>
-            <a:r>
-              <a:rPr lang="en-US" smtClean="0"/>
+              <a:rPr lang="en-US"/>
               <a:t>Add a footer</a:t>
             </a:r>
             <a:endParaRPr lang="en-US" dirty="0"/>
           </a:p>
         </p:txBody>
       </p:sp>
+      <p:pic>
+        <p:nvPicPr>
+          <p:cNvPr id="4098" name="Picture 2" descr="https://hourofcode.com/images/social-media/jeff_bezos.png">
+            <a:extLst>
+              <a:ext uri="{FF2B5EF4-FFF2-40B4-BE49-F238E27FC236}">
+                <a16:creationId xmlns:a16="http://schemas.microsoft.com/office/drawing/2014/main" id="{E0DB9635-747A-476F-BBE1-94153E781751}"/>
+              </a:ext>
+            </a:extLst>
+          </p:cNvPr>
+          <p:cNvPicPr>
+            <a:picLocks noChangeAspect="1" noChangeArrowheads="1"/>
+          </p:cNvPicPr>
+          <p:nvPr/>
+        </p:nvPicPr>
+        <p:blipFill>
+          <a:blip r:embed="rId2">
+            <a:extLst>
+              <a:ext uri="{28A0092B-C50C-407E-A947-70E740481C1C}">
+                <a14:useLocalDpi xmlns:a14="http://schemas.microsoft.com/office/drawing/2010/main" val="0"/>
+              </a:ext>
+            </a:extLst>
+          </a:blip>
+          <a:srcRect/>
+          <a:stretch>
+            <a:fillRect/>
+          </a:stretch>
+        </p:blipFill>
+        <p:spPr bwMode="auto">
+          <a:xfrm>
+            <a:off x="0" y="0"/>
+            <a:ext cx="12192000" cy="6858000"/>
+          </a:xfrm>
+          <a:prstGeom prst="rect">
+            <a:avLst/>
+          </a:prstGeom>
+          <a:noFill/>
+          <a:extLst>
+            <a:ext uri="{909E8E84-426E-40DD-AFC4-6F175D3DCCD1}">
+              <a14:hiddenFill xmlns:a14="http://schemas.microsoft.com/office/drawing/2010/main">
+                <a:solidFill>
+                  <a:srgbClr val="FFFFFF"/>
+                </a:solidFill>
+              </a14:hiddenFill>
+            </a:ext>
+          </a:extLst>
+        </p:spPr>
+      </p:pic>
     </p:spTree>
     <p:extLst>
       <p:ext uri="{BB962C8B-B14F-4D97-AF65-F5344CB8AC3E}">
-        <p14:creationId xmlns:p14="http://schemas.microsoft.com/office/powerpoint/2010/main" val="1846275314"/>
+        <p14:creationId xmlns:p14="http://schemas.microsoft.com/office/powerpoint/2010/main" val="89451350"/>
       </p:ext>
     </p:extLst>
   </p:cSld>
@@ -7024,6 +6892,31 @@
 <file path=ppt/slides/slide5.xml><?xml version="1.0" encoding="utf-8"?>
 <p:sld xmlns:a="http://schemas.openxmlformats.org/drawingml/2006/main" xmlns:r="http://schemas.openxmlformats.org/officeDocument/2006/relationships" xmlns:p="http://schemas.openxmlformats.org/presentationml/2006/main">
   <p:cSld>
+    <p:bg>
+      <p:bgPr>
+        <a:gradFill rotWithShape="1">
+          <a:gsLst>
+            <a:gs pos="10000">
+              <a:schemeClr val="bg1">
+                <a:tint val="97000"/>
+                <a:hueMod val="92000"/>
+                <a:satMod val="169000"/>
+                <a:lumMod val="164000"/>
+              </a:schemeClr>
+            </a:gs>
+            <a:gs pos="100000">
+              <a:schemeClr val="bg1">
+                <a:shade val="96000"/>
+                <a:satMod val="120000"/>
+                <a:lumMod val="90000"/>
+              </a:schemeClr>
+            </a:gs>
+          </a:gsLst>
+          <a:lin ang="6120000" scaled="1"/>
+        </a:gradFill>
+        <a:effectLst/>
+      </p:bgPr>
+    </p:bg>
     <p:spTree>
       <p:nvGrpSpPr>
         <p:cNvPr id="1" name=""/>
@@ -7045,82 +6938,743 @@
             <a:spLocks noGrp="1"/>
           </p:cNvSpPr>
           <p:nvPr>
-            <p:ph type="title"/>
+            <p:ph type="ctrTitle"/>
+          </p:nvPr>
+        </p:nvSpPr>
+        <p:spPr>
+          <a:xfrm>
+            <a:off x="684212" y="685799"/>
+            <a:ext cx="9678988" cy="3673474"/>
+          </a:xfrm>
+        </p:spPr>
+        <p:txBody>
+          <a:bodyPr>
+            <a:normAutofit/>
+          </a:bodyPr>
+          <a:lstStyle/>
+          <a:p>
+            <a:r>
+              <a:rPr lang="en-US" sz="6000">
+                <a:solidFill>
+                  <a:schemeClr val="tx2"/>
+                </a:solidFill>
+              </a:rPr>
+              <a:t>Design and drawing for production</a:t>
+            </a:r>
+          </a:p>
+        </p:txBody>
+      </p:sp>
+      <p:sp>
+        <p:nvSpPr>
+          <p:cNvPr id="3" name="Subtitle 2"/>
+          <p:cNvSpPr>
+            <a:spLocks noGrp="1"/>
+          </p:cNvSpPr>
+          <p:nvPr>
+            <p:ph type="subTitle" idx="1"/>
+          </p:nvPr>
+        </p:nvSpPr>
+        <p:spPr>
+          <a:xfrm>
+            <a:off x="684212" y="4648198"/>
+            <a:ext cx="7005742" cy="1143002"/>
+          </a:xfrm>
+        </p:spPr>
+        <p:txBody>
+          <a:bodyPr>
+            <a:normAutofit/>
+          </a:bodyPr>
+          <a:lstStyle/>
+          <a:p>
+            <a:pPr>
+              <a:lnSpc>
+                <a:spcPct val="90000"/>
+              </a:lnSpc>
+            </a:pPr>
+            <a:r>
+              <a:rPr lang="en-US" sz="1900" dirty="0">
+                <a:solidFill>
+                  <a:schemeClr val="tx1">
+                    <a:alpha val="80000"/>
+                  </a:schemeClr>
+                </a:solidFill>
+              </a:rPr>
+              <a:t>Unit 6 – Multiview Drawing</a:t>
+            </a:r>
+          </a:p>
+          <a:p>
+            <a:pPr>
+              <a:lnSpc>
+                <a:spcPct val="90000"/>
+              </a:lnSpc>
+            </a:pPr>
+            <a:endParaRPr lang="en-US" sz="1900" dirty="0">
+              <a:solidFill>
+                <a:schemeClr val="tx1">
+                  <a:alpha val="80000"/>
+                </a:schemeClr>
+              </a:solidFill>
+            </a:endParaRPr>
+          </a:p>
+          <a:p>
+            <a:pPr>
+              <a:lnSpc>
+                <a:spcPct val="90000"/>
+              </a:lnSpc>
+            </a:pPr>
+            <a:r>
+              <a:rPr lang="en-US" sz="1900" dirty="0">
+                <a:solidFill>
+                  <a:schemeClr val="tx1">
+                    <a:alpha val="80000"/>
+                  </a:schemeClr>
+                </a:solidFill>
+              </a:rPr>
+              <a:t>Section 1 – Orthographic Projections</a:t>
+            </a:r>
+          </a:p>
+        </p:txBody>
+      </p:sp>
+      <p:sp>
+        <p:nvSpPr>
+          <p:cNvPr id="4" name="Footer Placeholder 3">
+            <a:extLst>
+              <a:ext uri="{FF2B5EF4-FFF2-40B4-BE49-F238E27FC236}">
+                <a16:creationId xmlns:a16="http://schemas.microsoft.com/office/drawing/2014/main" id="{1BD89EEB-0D82-48BB-B45A-39C4807CF951}"/>
+              </a:ext>
+            </a:extLst>
+          </p:cNvPr>
+          <p:cNvSpPr>
+            <a:spLocks noGrp="1"/>
+          </p:cNvSpPr>
+          <p:nvPr>
+            <p:ph type="ftr" sz="quarter" idx="11"/>
           </p:nvPr>
         </p:nvSpPr>
         <p:spPr/>
         <p:txBody>
-          <a:bodyPr/>
-          <a:lstStyle/>
-          <a:p>
-            <a:r>
-              <a:rPr lang="en-US" dirty="0" smtClean="0"/>
-              <a:t>Straight lines</a:t>
-            </a:r>
-            <a:endParaRPr lang="en-US" dirty="0"/>
-          </a:p>
-        </p:txBody>
-      </p:sp>
-      <p:sp>
-        <p:nvSpPr>
-          <p:cNvPr id="3" name="Content Placeholder 2"/>
-          <p:cNvSpPr>
-            <a:spLocks noGrp="1"/>
-          </p:cNvSpPr>
-          <p:nvPr>
-            <p:ph idx="1"/>
-          </p:nvPr>
-        </p:nvSpPr>
-        <p:spPr/>
-        <p:txBody>
-          <a:bodyPr/>
-          <a:lstStyle/>
-          <a:p>
-            <a:r>
-              <a:rPr lang="en-US" dirty="0" smtClean="0"/>
-              <a:t>Line drawing</a:t>
-            </a:r>
-          </a:p>
-          <a:p>
-            <a:r>
-              <a:rPr lang="en-US" dirty="0" smtClean="0"/>
-              <a:t>A parallel line can also be drawn with just a triangle and t-</a:t>
-            </a:r>
-            <a:r>
-              <a:rPr lang="en-US" dirty="0" err="1" smtClean="0"/>
-              <a:t>sqaure</a:t>
-            </a:r>
-            <a:endParaRPr lang="en-US" dirty="0"/>
-          </a:p>
-        </p:txBody>
-      </p:sp>
-      <p:sp>
-        <p:nvSpPr>
-          <p:cNvPr id="4" name="Footer Placeholder 3"/>
-          <p:cNvSpPr>
-            <a:spLocks noGrp="1"/>
-          </p:cNvSpPr>
-          <p:nvPr>
-            <p:ph type="ftr" sz="quarter" idx="11"/>
-          </p:nvPr>
-        </p:nvSpPr>
-        <p:spPr/>
-        <p:txBody>
-          <a:bodyPr/>
-          <a:lstStyle/>
-          <a:p>
-            <a:r>
-              <a:rPr lang="en-US" smtClean="0"/>
-              <a:t>Add a footer</a:t>
-            </a:r>
-            <a:endParaRPr lang="en-US" dirty="0"/>
+          <a:bodyPr>
+            <a:normAutofit/>
+          </a:bodyPr>
+          <a:lstStyle/>
+          <a:p>
+            <a:pPr>
+              <a:spcAft>
+                <a:spcPts val="600"/>
+              </a:spcAft>
+            </a:pPr>
+            <a:r>
+              <a:rPr lang="en-US">
+                <a:solidFill>
+                  <a:schemeClr val="tx2"/>
+                </a:solidFill>
+              </a:rPr>
+              <a:t>Unit 1 – Section 1</a:t>
+            </a:r>
           </a:p>
         </p:txBody>
       </p:sp>
     </p:spTree>
     <p:extLst>
       <p:ext uri="{BB962C8B-B14F-4D97-AF65-F5344CB8AC3E}">
-        <p14:creationId xmlns:p14="http://schemas.microsoft.com/office/powerpoint/2010/main" val="1722530102"/>
+        <p14:creationId xmlns:p14="http://schemas.microsoft.com/office/powerpoint/2010/main" val="2413251912"/>
+      </p:ext>
+    </p:extLst>
+  </p:cSld>
+  <p:clrMapOvr>
+    <a:overrideClrMapping bg1="lt1" tx1="dk1" bg2="lt2" tx2="dk2" accent1="accent1" accent2="accent2" accent3="accent3" accent4="accent4" accent5="accent5" accent6="accent6" hlink="hlink" folHlink="folHlink"/>
+  </p:clrMapOvr>
+  <mc:AlternateContent xmlns:mc="http://schemas.openxmlformats.org/markup-compatibility/2006" xmlns:p14="http://schemas.microsoft.com/office/powerpoint/2010/main">
+    <mc:Choice Requires="p14">
+      <p:transition spd="med" p14:dur="700">
+        <p:fade/>
+      </p:transition>
+    </mc:Choice>
+    <mc:Fallback xmlns="">
+      <p:transition spd="med">
+        <p:fade/>
+      </p:transition>
+    </mc:Fallback>
+  </mc:AlternateContent>
+</p:sld>
+</file>
+
+<file path=ppt/slides/slide6.xml><?xml version="1.0" encoding="utf-8"?>
+<p:sld xmlns:a="http://schemas.openxmlformats.org/drawingml/2006/main" xmlns:r="http://schemas.openxmlformats.org/officeDocument/2006/relationships" xmlns:p="http://schemas.openxmlformats.org/presentationml/2006/main">
+  <p:cSld>
+    <p:bg>
+      <p:bgPr>
+        <a:gradFill rotWithShape="1">
+          <a:gsLst>
+            <a:gs pos="10000">
+              <a:schemeClr val="bg2">
+                <a:tint val="97000"/>
+                <a:hueMod val="92000"/>
+                <a:satMod val="169000"/>
+                <a:lumMod val="164000"/>
+              </a:schemeClr>
+            </a:gs>
+            <a:gs pos="100000">
+              <a:schemeClr val="bg2">
+                <a:shade val="96000"/>
+                <a:satMod val="120000"/>
+                <a:lumMod val="90000"/>
+              </a:schemeClr>
+            </a:gs>
+          </a:gsLst>
+          <a:lin ang="6120000" scaled="1"/>
+        </a:gradFill>
+        <a:effectLst/>
+      </p:bgPr>
+    </p:bg>
+    <p:spTree>
+      <p:nvGrpSpPr>
+        <p:cNvPr id="1" name=""/>
+        <p:cNvGrpSpPr/>
+        <p:nvPr/>
+      </p:nvGrpSpPr>
+      <p:grpSpPr>
+        <a:xfrm>
+          <a:off x="0" y="0"/>
+          <a:ext cx="0" cy="0"/>
+          <a:chOff x="0" y="0"/>
+          <a:chExt cx="0" cy="0"/>
+        </a:xfrm>
+      </p:grpSpPr>
+      <p:sp>
+        <p:nvSpPr>
+          <p:cNvPr id="2" name="Title 1"/>
+          <p:cNvSpPr>
+            <a:spLocks noGrp="1"/>
+          </p:cNvSpPr>
+          <p:nvPr>
+            <p:ph type="title"/>
+          </p:nvPr>
+        </p:nvSpPr>
+        <p:spPr>
+          <a:xfrm>
+            <a:off x="684212" y="685799"/>
+            <a:ext cx="3747111" cy="4892040"/>
+          </a:xfrm>
+        </p:spPr>
+        <p:txBody>
+          <a:bodyPr>
+            <a:normAutofit/>
+          </a:bodyPr>
+          <a:lstStyle/>
+          <a:p>
+            <a:pPr algn="r"/>
+            <a:r>
+              <a:rPr lang="en-US"/>
+              <a:t>The big idea</a:t>
+            </a:r>
+          </a:p>
+        </p:txBody>
+      </p:sp>
+      <p:sp>
+        <p:nvSpPr>
+          <p:cNvPr id="3" name="Content Placeholder 2"/>
+          <p:cNvSpPr>
+            <a:spLocks noGrp="1"/>
+          </p:cNvSpPr>
+          <p:nvPr>
+            <p:ph idx="1"/>
+          </p:nvPr>
+        </p:nvSpPr>
+        <p:spPr>
+          <a:xfrm>
+            <a:off x="4979962" y="685799"/>
+            <a:ext cx="6288260" cy="4892040"/>
+          </a:xfrm>
+        </p:spPr>
+        <p:txBody>
+          <a:bodyPr>
+            <a:normAutofit/>
+          </a:bodyPr>
+          <a:lstStyle/>
+          <a:p>
+            <a:r>
+              <a:rPr lang="en-US" dirty="0">
+                <a:solidFill>
+                  <a:schemeClr val="tx1"/>
+                </a:solidFill>
+                <a:cs typeface="Arial" pitchFamily="34" charset="0"/>
+              </a:rPr>
+              <a:t>Process of explaining three-dimensional objects in two-dimensions</a:t>
+            </a:r>
+          </a:p>
+          <a:p>
+            <a:r>
+              <a:rPr lang="en-US" dirty="0">
+                <a:solidFill>
+                  <a:schemeClr val="tx1"/>
+                </a:solidFill>
+                <a:cs typeface="Arial" pitchFamily="34" charset="0"/>
+              </a:rPr>
+              <a:t>Called Orthographic Projections or Multiview Drawings</a:t>
+            </a:r>
+          </a:p>
+          <a:p>
+            <a:r>
+              <a:rPr lang="en-US" dirty="0">
+                <a:solidFill>
+                  <a:schemeClr val="tx1"/>
+                </a:solidFill>
+                <a:cs typeface="Arial" pitchFamily="34" charset="0"/>
+              </a:rPr>
+              <a:t>Typically have three views</a:t>
+            </a:r>
+          </a:p>
+          <a:p>
+            <a:endParaRPr lang="en-US" dirty="0">
+              <a:solidFill>
+                <a:schemeClr val="tx1"/>
+              </a:solidFill>
+              <a:cs typeface="Arial" pitchFamily="34" charset="0"/>
+            </a:endParaRPr>
+          </a:p>
+        </p:txBody>
+      </p:sp>
+      <p:sp>
+        <p:nvSpPr>
+          <p:cNvPr id="4" name="Footer Placeholder 3">
+            <a:extLst>
+              <a:ext uri="{FF2B5EF4-FFF2-40B4-BE49-F238E27FC236}">
+                <a16:creationId xmlns:a16="http://schemas.microsoft.com/office/drawing/2014/main" id="{EADFB87E-2A3F-4815-8F5E-3CF3521EBF24}"/>
+              </a:ext>
+            </a:extLst>
+          </p:cNvPr>
+          <p:cNvSpPr>
+            <a:spLocks noGrp="1"/>
+          </p:cNvSpPr>
+          <p:nvPr>
+            <p:ph type="ftr" sz="quarter" idx="11"/>
+          </p:nvPr>
+        </p:nvSpPr>
+        <p:spPr/>
+        <p:txBody>
+          <a:bodyPr>
+            <a:normAutofit/>
+          </a:bodyPr>
+          <a:lstStyle/>
+          <a:p>
+            <a:pPr>
+              <a:spcAft>
+                <a:spcPts val="600"/>
+              </a:spcAft>
+            </a:pPr>
+            <a:r>
+              <a:rPr lang="en-US">
+                <a:solidFill>
+                  <a:schemeClr val="tx1">
+                    <a:alpha val="80000"/>
+                  </a:schemeClr>
+                </a:solidFill>
+              </a:rPr>
+              <a:t>Unit 1 – Section 1 - Day 1</a:t>
+            </a:r>
+          </a:p>
+        </p:txBody>
+      </p:sp>
+    </p:spTree>
+    <p:extLst>
+      <p:ext uri="{BB962C8B-B14F-4D97-AF65-F5344CB8AC3E}">
+        <p14:creationId xmlns:p14="http://schemas.microsoft.com/office/powerpoint/2010/main" val="78530218"/>
+      </p:ext>
+    </p:extLst>
+  </p:cSld>
+  <p:clrMapOvr>
+    <a:masterClrMapping/>
+  </p:clrMapOvr>
+  <mc:AlternateContent xmlns:mc="http://schemas.openxmlformats.org/markup-compatibility/2006" xmlns:p14="http://schemas.microsoft.com/office/powerpoint/2010/main">
+    <mc:Choice Requires="p14">
+      <p:transition spd="med" p14:dur="700">
+        <p:fade/>
+      </p:transition>
+    </mc:Choice>
+    <mc:Fallback xmlns="">
+      <p:transition spd="med">
+        <p:fade/>
+      </p:transition>
+    </mc:Fallback>
+  </mc:AlternateContent>
+</p:sld>
+</file>
+
+<file path=ppt/slides/slide7.xml><?xml version="1.0" encoding="utf-8"?>
+<p:sld xmlns:a="http://schemas.openxmlformats.org/drawingml/2006/main" xmlns:r="http://schemas.openxmlformats.org/officeDocument/2006/relationships" xmlns:p="http://schemas.openxmlformats.org/presentationml/2006/main">
+  <p:cSld>
+    <p:spTree>
+      <p:nvGrpSpPr>
+        <p:cNvPr id="1" name=""/>
+        <p:cNvGrpSpPr/>
+        <p:nvPr/>
+      </p:nvGrpSpPr>
+      <p:grpSpPr>
+        <a:xfrm>
+          <a:off x="0" y="0"/>
+          <a:ext cx="0" cy="0"/>
+          <a:chOff x="0" y="0"/>
+          <a:chExt cx="0" cy="0"/>
+        </a:xfrm>
+      </p:grpSpPr>
+      <p:sp>
+        <p:nvSpPr>
+          <p:cNvPr id="2" name="Title 1">
+            <a:extLst>
+              <a:ext uri="{FF2B5EF4-FFF2-40B4-BE49-F238E27FC236}">
+                <a16:creationId xmlns:a16="http://schemas.microsoft.com/office/drawing/2014/main" id="{1FF8590C-0CF8-46FE-AA7B-736D0ED7233F}"/>
+              </a:ext>
+            </a:extLst>
+          </p:cNvPr>
+          <p:cNvSpPr>
+            <a:spLocks noGrp="1"/>
+          </p:cNvSpPr>
+          <p:nvPr>
+            <p:ph type="title"/>
+          </p:nvPr>
+        </p:nvSpPr>
+        <p:spPr/>
+        <p:txBody>
+          <a:bodyPr/>
+          <a:lstStyle/>
+          <a:p>
+            <a:r>
+              <a:rPr lang="en-US" dirty="0"/>
+              <a:t>Multiview drawing</a:t>
+            </a:r>
+          </a:p>
+        </p:txBody>
+      </p:sp>
+      <p:sp>
+        <p:nvSpPr>
+          <p:cNvPr id="3" name="Content Placeholder 2">
+            <a:extLst>
+              <a:ext uri="{FF2B5EF4-FFF2-40B4-BE49-F238E27FC236}">
+                <a16:creationId xmlns:a16="http://schemas.microsoft.com/office/drawing/2014/main" id="{1F9B70FE-72EF-4757-97CF-3C2542F11181}"/>
+              </a:ext>
+            </a:extLst>
+          </p:cNvPr>
+          <p:cNvSpPr>
+            <a:spLocks noGrp="1"/>
+          </p:cNvSpPr>
+          <p:nvPr>
+            <p:ph idx="1"/>
+          </p:nvPr>
+        </p:nvSpPr>
+        <p:spPr/>
+        <p:txBody>
+          <a:bodyPr/>
+          <a:lstStyle/>
+          <a:p>
+            <a:r>
+              <a:rPr lang="en-US" dirty="0"/>
+              <a:t>A major type of drawing used in industry</a:t>
+            </a:r>
+          </a:p>
+          <a:p>
+            <a:r>
+              <a:rPr lang="en-US" dirty="0"/>
+              <a:t>The views show size and shape of an object</a:t>
+            </a:r>
+          </a:p>
+          <a:p>
+            <a:r>
+              <a:rPr lang="en-US" dirty="0"/>
+              <a:t>They are arranged in such a way to incorporate projections</a:t>
+            </a:r>
+          </a:p>
+          <a:p>
+            <a:pPr lvl="1"/>
+            <a:r>
+              <a:rPr lang="en-US" dirty="0"/>
+              <a:t>Top view is always above the front view</a:t>
+            </a:r>
+          </a:p>
+          <a:p>
+            <a:pPr lvl="1"/>
+            <a:r>
+              <a:rPr lang="en-US" dirty="0"/>
+              <a:t>The right-side view normally appears to the right of the front view</a:t>
+            </a:r>
+          </a:p>
+          <a:p>
+            <a:r>
+              <a:rPr lang="en-US" dirty="0"/>
+              <a:t>Lines are either parallel or perpendicular to one another</a:t>
+            </a:r>
+          </a:p>
+        </p:txBody>
+      </p:sp>
+      <p:sp>
+        <p:nvSpPr>
+          <p:cNvPr id="4" name="Footer Placeholder 3">
+            <a:extLst>
+              <a:ext uri="{FF2B5EF4-FFF2-40B4-BE49-F238E27FC236}">
+                <a16:creationId xmlns:a16="http://schemas.microsoft.com/office/drawing/2014/main" id="{0EABF712-DECE-4130-945D-18361DC1AAE8}"/>
+              </a:ext>
+            </a:extLst>
+          </p:cNvPr>
+          <p:cNvSpPr>
+            <a:spLocks noGrp="1"/>
+          </p:cNvSpPr>
+          <p:nvPr>
+            <p:ph type="ftr" sz="quarter" idx="11"/>
+          </p:nvPr>
+        </p:nvSpPr>
+        <p:spPr/>
+        <p:txBody>
+          <a:bodyPr/>
+          <a:lstStyle/>
+          <a:p>
+            <a:r>
+              <a:rPr lang="en-US"/>
+              <a:t>Add a footer</a:t>
+            </a:r>
+            <a:endParaRPr lang="en-US" dirty="0"/>
+          </a:p>
+        </p:txBody>
+      </p:sp>
+    </p:spTree>
+    <p:extLst>
+      <p:ext uri="{BB962C8B-B14F-4D97-AF65-F5344CB8AC3E}">
+        <p14:creationId xmlns:p14="http://schemas.microsoft.com/office/powerpoint/2010/main" val="4251624219"/>
+      </p:ext>
+    </p:extLst>
+  </p:cSld>
+  <p:clrMapOvr>
+    <a:masterClrMapping/>
+  </p:clrMapOvr>
+  <mc:AlternateContent xmlns:mc="http://schemas.openxmlformats.org/markup-compatibility/2006" xmlns:p14="http://schemas.microsoft.com/office/powerpoint/2010/main">
+    <mc:Choice Requires="p14">
+      <p:transition spd="med" p14:dur="700">
+        <p:fade/>
+      </p:transition>
+    </mc:Choice>
+    <mc:Fallback xmlns="">
+      <p:transition spd="med">
+        <p:fade/>
+      </p:transition>
+    </mc:Fallback>
+  </mc:AlternateContent>
+</p:sld>
+</file>
+
+<file path=ppt/slides/slide8.xml><?xml version="1.0" encoding="utf-8"?>
+<p:sld xmlns:a="http://schemas.openxmlformats.org/drawingml/2006/main" xmlns:r="http://schemas.openxmlformats.org/officeDocument/2006/relationships" xmlns:p="http://schemas.openxmlformats.org/presentationml/2006/main">
+  <p:cSld>
+    <p:spTree>
+      <p:nvGrpSpPr>
+        <p:cNvPr id="1" name=""/>
+        <p:cNvGrpSpPr/>
+        <p:nvPr/>
+      </p:nvGrpSpPr>
+      <p:grpSpPr>
+        <a:xfrm>
+          <a:off x="0" y="0"/>
+          <a:ext cx="0" cy="0"/>
+          <a:chOff x="0" y="0"/>
+          <a:chExt cx="0" cy="0"/>
+        </a:xfrm>
+      </p:grpSpPr>
+      <p:sp>
+        <p:nvSpPr>
+          <p:cNvPr id="4" name="Footer Placeholder 3">
+            <a:extLst>
+              <a:ext uri="{FF2B5EF4-FFF2-40B4-BE49-F238E27FC236}">
+                <a16:creationId xmlns:a16="http://schemas.microsoft.com/office/drawing/2014/main" id="{CE57332D-427D-4707-A719-9297E73B5D95}"/>
+              </a:ext>
+            </a:extLst>
+          </p:cNvPr>
+          <p:cNvSpPr>
+            <a:spLocks noGrp="1"/>
+          </p:cNvSpPr>
+          <p:nvPr>
+            <p:ph type="ftr" sz="quarter" idx="11"/>
+          </p:nvPr>
+        </p:nvSpPr>
+        <p:spPr/>
+        <p:txBody>
+          <a:bodyPr/>
+          <a:lstStyle/>
+          <a:p>
+            <a:r>
+              <a:rPr lang="en-US"/>
+              <a:t>Add a footer</a:t>
+            </a:r>
+            <a:endParaRPr lang="en-US" dirty="0"/>
+          </a:p>
+        </p:txBody>
+      </p:sp>
+      <p:pic>
+        <p:nvPicPr>
+          <p:cNvPr id="1026" name="Picture 2" descr="Related image">
+            <a:extLst>
+              <a:ext uri="{FF2B5EF4-FFF2-40B4-BE49-F238E27FC236}">
+                <a16:creationId xmlns:a16="http://schemas.microsoft.com/office/drawing/2014/main" id="{B57C6FD5-7EF9-4EE6-9798-02221C14679C}"/>
+              </a:ext>
+            </a:extLst>
+          </p:cNvPr>
+          <p:cNvPicPr>
+            <a:picLocks noChangeAspect="1" noChangeArrowheads="1"/>
+          </p:cNvPicPr>
+          <p:nvPr/>
+        </p:nvPicPr>
+        <p:blipFill>
+          <a:blip r:embed="rId2">
+            <a:extLst>
+              <a:ext uri="{28A0092B-C50C-407E-A947-70E740481C1C}">
+                <a14:useLocalDpi xmlns:a14="http://schemas.microsoft.com/office/drawing/2010/main" val="0"/>
+              </a:ext>
+            </a:extLst>
+          </a:blip>
+          <a:srcRect/>
+          <a:stretch>
+            <a:fillRect/>
+          </a:stretch>
+        </p:blipFill>
+        <p:spPr bwMode="auto">
+          <a:xfrm>
+            <a:off x="91338" y="236764"/>
+            <a:ext cx="12012138" cy="5804807"/>
+          </a:xfrm>
+          <a:prstGeom prst="rect">
+            <a:avLst/>
+          </a:prstGeom>
+          <a:noFill/>
+          <a:extLst>
+            <a:ext uri="{909E8E84-426E-40DD-AFC4-6F175D3DCCD1}">
+              <a14:hiddenFill xmlns:a14="http://schemas.microsoft.com/office/drawing/2010/main">
+                <a:solidFill>
+                  <a:srgbClr val="FFFFFF"/>
+                </a:solidFill>
+              </a14:hiddenFill>
+            </a:ext>
+          </a:extLst>
+        </p:spPr>
+      </p:pic>
+    </p:spTree>
+    <p:extLst>
+      <p:ext uri="{BB962C8B-B14F-4D97-AF65-F5344CB8AC3E}">
+        <p14:creationId xmlns:p14="http://schemas.microsoft.com/office/powerpoint/2010/main" val="1592364933"/>
+      </p:ext>
+    </p:extLst>
+  </p:cSld>
+  <p:clrMapOvr>
+    <a:masterClrMapping/>
+  </p:clrMapOvr>
+  <mc:AlternateContent xmlns:mc="http://schemas.openxmlformats.org/markup-compatibility/2006" xmlns:p14="http://schemas.microsoft.com/office/powerpoint/2010/main">
+    <mc:Choice Requires="p14">
+      <p:transition spd="med" p14:dur="700">
+        <p:fade/>
+      </p:transition>
+    </mc:Choice>
+    <mc:Fallback xmlns="">
+      <p:transition spd="med">
+        <p:fade/>
+      </p:transition>
+    </mc:Fallback>
+  </mc:AlternateContent>
+</p:sld>
+</file>
+
+<file path=ppt/slides/slide9.xml><?xml version="1.0" encoding="utf-8"?>
+<p:sld xmlns:a="http://schemas.openxmlformats.org/drawingml/2006/main" xmlns:r="http://schemas.openxmlformats.org/officeDocument/2006/relationships" xmlns:p="http://schemas.openxmlformats.org/presentationml/2006/main">
+  <p:cSld>
+    <p:spTree>
+      <p:nvGrpSpPr>
+        <p:cNvPr id="1" name=""/>
+        <p:cNvGrpSpPr/>
+        <p:nvPr/>
+      </p:nvGrpSpPr>
+      <p:grpSpPr>
+        <a:xfrm>
+          <a:off x="0" y="0"/>
+          <a:ext cx="0" cy="0"/>
+          <a:chOff x="0" y="0"/>
+          <a:chExt cx="0" cy="0"/>
+        </a:xfrm>
+      </p:grpSpPr>
+      <p:sp>
+        <p:nvSpPr>
+          <p:cNvPr id="2" name="Footer Placeholder 1">
+            <a:extLst>
+              <a:ext uri="{FF2B5EF4-FFF2-40B4-BE49-F238E27FC236}">
+                <a16:creationId xmlns:a16="http://schemas.microsoft.com/office/drawing/2014/main" id="{EDCDC379-6C88-48CA-A6AE-B4056F03723D}"/>
+              </a:ext>
+            </a:extLst>
+          </p:cNvPr>
+          <p:cNvSpPr>
+            <a:spLocks noGrp="1"/>
+          </p:cNvSpPr>
+          <p:nvPr>
+            <p:ph type="ftr" sz="quarter" idx="11"/>
+          </p:nvPr>
+        </p:nvSpPr>
+        <p:spPr/>
+        <p:txBody>
+          <a:bodyPr/>
+          <a:lstStyle/>
+          <a:p>
+            <a:r>
+              <a:rPr lang="en-US"/>
+              <a:t>Add a footer</a:t>
+            </a:r>
+            <a:endParaRPr lang="en-US" dirty="0"/>
+          </a:p>
+        </p:txBody>
+      </p:sp>
+      <p:pic>
+        <p:nvPicPr>
+          <p:cNvPr id="6146" name="Picture 2" descr="Image result for orthographic projection examples">
+            <a:extLst>
+              <a:ext uri="{FF2B5EF4-FFF2-40B4-BE49-F238E27FC236}">
+                <a16:creationId xmlns:a16="http://schemas.microsoft.com/office/drawing/2014/main" id="{9A7D147B-A03F-4FCB-9D1B-807601ADF89A}"/>
+              </a:ext>
+            </a:extLst>
+          </p:cNvPr>
+          <p:cNvPicPr>
+            <a:picLocks noChangeAspect="1" noChangeArrowheads="1"/>
+          </p:cNvPicPr>
+          <p:nvPr/>
+        </p:nvPicPr>
+        <p:blipFill>
+          <a:blip r:embed="rId2">
+            <a:extLst>
+              <a:ext uri="{28A0092B-C50C-407E-A947-70E740481C1C}">
+                <a14:useLocalDpi xmlns:a14="http://schemas.microsoft.com/office/drawing/2010/main" val="0"/>
+              </a:ext>
+            </a:extLst>
+          </a:blip>
+          <a:srcRect/>
+          <a:stretch>
+            <a:fillRect/>
+          </a:stretch>
+        </p:blipFill>
+        <p:spPr bwMode="auto">
+          <a:xfrm>
+            <a:off x="238685" y="236765"/>
+            <a:ext cx="11560661" cy="6300560"/>
+          </a:xfrm>
+          <a:prstGeom prst="rect">
+            <a:avLst/>
+          </a:prstGeom>
+          <a:noFill/>
+          <a:extLst>
+            <a:ext uri="{909E8E84-426E-40DD-AFC4-6F175D3DCCD1}">
+              <a14:hiddenFill xmlns:a14="http://schemas.microsoft.com/office/drawing/2010/main">
+                <a:solidFill>
+                  <a:srgbClr val="FFFFFF"/>
+                </a:solidFill>
+              </a14:hiddenFill>
+            </a:ext>
+          </a:extLst>
+        </p:spPr>
+      </p:pic>
+    </p:spTree>
+    <p:extLst>
+      <p:ext uri="{BB962C8B-B14F-4D97-AF65-F5344CB8AC3E}">
+        <p14:creationId xmlns:p14="http://schemas.microsoft.com/office/powerpoint/2010/main" val="2672483260"/>
       </p:ext>
     </p:extLst>
   </p:cSld>

</xml_diff>